<commit_message>
Se le agregan las áreas de trabajo al power point
</commit_message>
<xml_diff>
--- a/Clase 3/Clase 3.pptx
+++ b/Clase 3/Clase 3.pptx
@@ -5,34 +5,35 @@
     <p:sldMasterId id="2147483648" r:id="rId1"/>
   </p:sldMasterIdLst>
   <p:notesMasterIdLst>
-    <p:notesMasterId r:id="rId7"/>
+    <p:notesMasterId r:id="rId8"/>
   </p:notesMasterIdLst>
   <p:sldIdLst>
     <p:sldId id="256" r:id="rId2"/>
     <p:sldId id="262" r:id="rId3"/>
     <p:sldId id="285" r:id="rId4"/>
-    <p:sldId id="296" r:id="rId5"/>
-    <p:sldId id="291" r:id="rId6"/>
+    <p:sldId id="297" r:id="rId5"/>
+    <p:sldId id="296" r:id="rId6"/>
+    <p:sldId id="291" r:id="rId7"/>
   </p:sldIdLst>
   <p:sldSz cx="18288000" cy="10287000"/>
   <p:notesSz cx="6858000" cy="9144000"/>
   <p:embeddedFontLst>
     <p:embeddedFont>
       <p:font typeface="Poppins" panose="00000500000000000000" pitchFamily="2" charset="0"/>
-      <p:regular r:id="rId8"/>
-      <p:bold r:id="rId9"/>
-      <p:italic r:id="rId10"/>
-      <p:boldItalic r:id="rId11"/>
+      <p:regular r:id="rId9"/>
+      <p:bold r:id="rId10"/>
+      <p:italic r:id="rId11"/>
+      <p:boldItalic r:id="rId12"/>
     </p:embeddedFont>
     <p:embeddedFont>
       <p:font typeface="Poppins Bold" panose="00000800000000000000" charset="0"/>
-      <p:regular r:id="rId12"/>
-      <p:bold r:id="rId13"/>
+      <p:regular r:id="rId13"/>
+      <p:bold r:id="rId14"/>
     </p:embeddedFont>
     <p:embeddedFont>
       <p:font typeface="Poppins Medium" panose="00000600000000000000" pitchFamily="2" charset="0"/>
-      <p:regular r:id="rId14"/>
-      <p:italic r:id="rId15"/>
+      <p:regular r:id="rId15"/>
+      <p:italic r:id="rId16"/>
     </p:embeddedFont>
   </p:embeddedFontLst>
   <p:defaultTextStyle>
@@ -149,6 +150,49 @@
 </p:presentation>
 </file>
 
+<file path=ppt/ink/ink1.xml><?xml version="1.0" encoding="utf-8"?>
+<inkml:ink xmlns:inkml="http://www.w3.org/2003/InkML">
+  <inkml:definitions>
+    <inkml:context xml:id="ctx0">
+      <inkml:inkSource xml:id="inkSrc0">
+        <inkml:traceFormat>
+          <inkml:channel name="X" type="integer" max="4160" units="cm"/>
+          <inkml:channel name="Y" type="integer" max="1448" units="cm"/>
+          <inkml:channel name="T" type="integer" max="2.14748E9" units="dev"/>
+        </inkml:traceFormat>
+        <inkml:channelProperties>
+          <inkml:channelProperty channel="X" name="resolution" value="120.93023" units="1/cm"/>
+          <inkml:channelProperty channel="Y" name="resolution" value="75.02591" units="1/cm"/>
+          <inkml:channelProperty channel="T" name="resolution" value="1" units="1/dev"/>
+        </inkml:channelProperties>
+      </inkml:inkSource>
+      <inkml:timestamp xml:id="ts0" timeString="2024-11-29T15:09:56.801"/>
+    </inkml:context>
+    <inkml:brush xml:id="br0">
+      <inkml:brushProperty name="width" value="0.05292" units="cm"/>
+      <inkml:brushProperty name="height" value="0.05292" units="cm"/>
+      <inkml:brushProperty name="color" value="#FF0000"/>
+    </inkml:brush>
+  </inkml:definitions>
+  <inkml:trace contextRef="#ctx0" brushRef="#br0">11906 9970 0,'64'0'15,"94"158"1,-94-126-1,-64 32 17,32-33-17,0-31 1,-32 32 0,31-32 62,96-127-63,95-159 1,32 128 0,-63-96-1,0 0 1,63 0 15,254-159 0,-350 318-15,-126 63 0,32 0 15,-33-32 16,1 33-32</inkml:trace>
+  <inkml:trace contextRef="#ctx0" brushRef="#br0" timeOffset="1764.07">20510 10827 0,'0'127'110,"0"159"187,0 94-266,0-348 0,64-127 125,285-318-124,128 1-1,348-96 0,-476 317-15,32 0-1,-190 65 1,-159 62 0</inkml:trace>
+  <inkml:trace contextRef="#ctx0" brushRef="#br0" timeOffset="4032.49">31337 15050 0,'-31'-32'250,"-65"222"-234,64 64-1,32-127 1,0-95-16,-31 31 16,62-63 437,255-190-438,127-191 1,-32 127 0,-159 63-1,32 1 1,-190 95-1,158-96 1,-32 64 0,-62 32-1,-33 31 1,32 1 0,-32 0-1,-63-1 1,-1 64 15,1-64 47,0 64-31</inkml:trace>
+  <inkml:trace contextRef="#ctx0" brushRef="#br0" timeOffset="21608.28">9366 4921 0,'-32'32'32,"32"0"108,128-64-124,-2-95-1,2 0 1,94 32 0,-95-32 15,190 0-15,477-95-1,-318 63 1,96 0-1,-128 32 1,32 0 0,32 32-1,32 0 1,-254 31 0,190 32-1,0-31 1,1 31-1,-160-31-15,350 63 32,127 0-17,-64 0 1,32 0 0,-191 0-1,128 0 1,-254 0-1,-160 0 1,192 0 0,126 0-1,159 0 1,-127 95 0,-223 0-16,33 0 15,412 96 1,-603-128-1,-63 1 17,-160-64-17,33 0 1,-64 31 0,159 97-1,-96-65 1,96 32-1,-32 1 1,-32 30 0,-31-62-16,-1 31 15,350 159 1,-254-159 0,-64 1-1,-32-1 1,33 0-1,-96 32 1,63-63 15</inkml:trace>
+  <inkml:trace contextRef="#ctx0" brushRef="#br0" timeOffset="22295.39">26416 4699 0,'349'191'31,"-698"-382"-31,1809 858 31,-1301-635-15,-127-1 0,0-31 46,127-31 1,31-319-32,-95 96 0,-31 64 0,-33 126-15,-31 32 0,0 1-1,0-1 1</inkml:trace>
+  <inkml:trace contextRef="#ctx0" brushRef="#br0" timeOffset="41237.23">18478 6160 0,'0'-32'63,"-95"-95"-47,-127 63-1,-64 64 1,-31 0-1,-1 0 1,64 0 0,127 0-1,-95 64 17,-32 31-17,191-63 1,-1 0-1,32-1 1,-63 96 0,32-31-1,-1 30 1,-31 2 0,63 30-1,32-94-15,-32 63 16,32-32-1,0 0-15,0-31 16,0 253 0,0-95 15,95 32-15,96 32-1,63 0 1,-95-96-1,63-31 1,64-95 0,158-33-1,191-31 1,191 0 0,-191-31-1,127-96 1,-413-32-1,-127-63 1,-95 63 0,-63-63-1,-1 0 17,-31-1-17,-32 96 1,0-31-1,0-65 1,-191-31 0,-507-254-1,63 127 1,64 127 0,94 64-1,255 126 1,63 64-1,-190 0 1,-286 0 0,-127 0 15,444 96-15,64-33-1,191-31 1</inkml:trace>
+  <inkml:trace contextRef="#ctx0" brushRef="#br0" timeOffset="47156.53">10033 17748 0,'191'0'140,"-96"0"-124,95 0 0,-95 0-1,-63 0-15,64 0 16,-1 0-1,95 0 1,191 0 0,-31 0-1,62 0 1,1 32 0,-318-32-1,32 0 1,-32 0-1,128 0 17,602 0-1,-634 0-15,-32 0-1,-1 0 1,64 0-1,128 0 1,-1 0 0,-127 0-1,-95 0 1,32 0 0,32-64-1,253 33 16,-158-33-15,-128 64 15,-62-63-15,-64 63 0,31-64-1,0-31 1,-31 32-1,0-1 1,-32 0 0,0-94-1,0 126 1,0 0-16,0-95 16,0 64-1,0-1 1,0 1-1,-32-64 17,-95 31-17,0 1 1,-31 32 0,-33-1-1,-126-63 1,-191-32-1,380 159 1,2-31-16,-192-33 16,128 64-1,-1-63 1,-31 31 0,-32-32-1,31 64 1,-94-31-1,95-1 17,-96 32-17,33 0 1,-33-32 0,-95-63-1,254 95 1,-31 0-1,0 0 1,-33 0 0,1 0-1,-32 0 1,-32 0 0,-95 0-1,286 0 1,-96 0-1,65 0 1,30 0-16,33 32 16,-32 0-1,-64 158 1,32-31 0,31-32-1,1 0 1,64-32-1,-33 64 1,0-64 0,33 32-1,-33-32 1,64-31 0,0-1-1,0-31-15,0 31 16,0 1-1,32 0 17,0-1-17,31-31 1,1 31 0,31 1-1,-63-64 1,31 32-1,33-1 1,30 33 0,-30-1-1,-33-31-15,32 0 16,-63-32 0,159 0 46,-128 0-46,128 0-1,-64 0 1,-95 0 0,31 0-1,-31 0 16,190 32-15,-63-1 0,-96-31-1,-31 0 1</inkml:trace>
+  <inkml:trace contextRef="#ctx0" brushRef="#br0" timeOffset="70718.75">25590 19431 0</inkml:trace>
+  <inkml:trace contextRef="#ctx0" brushRef="#br0" timeOffset="74127.34">25590 19431 0,'-31'63'422,"-255"96"-407,159-95 1,32-33 0,-32 33-1,63-32 1,32 0 15,1-32-15,-1 0-1,0 0 1,-31 0 0,-1 63-1,-31-63 1,-64 63-1,96-31 1,-64 0 0,63-32-16,64 32 15,-127 0 1,64-32 0,-96 0-1,-32 31 1,-31 33 15,64-64-15,-33 0-1,0 63 1,-94-31 0,-255-32-1,349 0 1,-158 0-1,159 0-15,-128 0 16,-63 64 0,32-33-1,-32 33 1,-32-64 0,-63 0-1,159 0 1,-33 0 15,192 0-15,-33-32-1,32 32 1,-31 0 0,-160 0-1,-158 0 1,64 0-1,31-32 1,32-63 0,191 95-1,63-64 1,63 64 0,-95-63 15,-126 0-31,-128-65 31,-222 33-15,286 64-1,127-1 1,-1 0 0,1-32-1,-127 33 1,-64-33-1,32 33 1,-32-33 0,159 0-1,32 64 1,95-31 0,-63-1-1,62-31 1,2 31 15,-128-32-15,126 64-1,-62-32 1,31 32 0,96-31-1,31 31 1</inkml:trace>
+  <inkml:trace contextRef="#ctx0" brushRef="#br0" timeOffset="75156.23">8954 18510 0,'-64'0'63,"-31"191"-48,31-96 1,33 0 0,-1-63-1,32 0 1,0 31 109,0 1-110,0-1 1,0-31 78,444 254-63,-222-191-15,-158-95-1</inkml:trace>
+  <inkml:trace contextRef="#ctx0" brushRef="#br0" timeOffset="82249.28">16637 21209 0,'0'-32'172,"-222"-31"-156,-32-33-1,63 65 1,33-33 0,30 1-1,-126 63 17,-63 0-1,190 0-16,-222 0 1,190 0 0,0 0-1,0 0 1,-31 0 0,-32 0-1,63 0 1,-63-32-1,127 0 1,-1 32 0,-31-32-1,-95 32 1,-32 0 15,63 0-31,-94 0 16,94 0-1,-31 0 1,0 0 0,-64 0-1,32 0 1,-95 0 0,158 0-1,64 0 1,-32 0-1,96 0 1,-223 64 0,96 31-1,-96-31 17,-95 31-1,254 0-16,0-31 1,95-64 0,32 63-1,-63-31 1,63 63 0,-64-31-1,64-1 1,-31 96-1,31-127 1,0-1 0,0 1-1,0 32 1,95-1 0,127-31 15,32-32-16,32 63 1,-127-63 0,-1 64-1,-62-64-15,-33 0 16,223 0 0,-32 0-1,63 0 1,-31 0-1,127 0 1,-159 0 0,31 0-1,33 0 1,63 0 15,95 0-15,1 0-1,-128 0 1,-190 0 0,-33 0-1,2 0 1,62 0 0,128 0-1,158 0 1,32 0-1,32 0 1,-64 0 0,-127 0-1,0 0 1,191 0 0,-222 0 15,-33 0-16,-62-32 1,-192 32 0,33-63-1,-1-1 17,1 1-17,-64-1 1,0 1-1,0-32 1,0 31 0,0 0-1,0-31 1,-127 32 15,-127-1-15,-64 1-1,64-32 1,64 95 0,95 0-1,63-32 1,-95 32 0,-191 0-1,-317-64 1,349 64-1,1 0 1,126 0 0,0 0-1,-63 0 1,-32 0 15,63 0-15,96 0-1</inkml:trace>
+  <inkml:trace contextRef="#ctx0" brushRef="#br0" timeOffset="96997.75">37306 7398 0,'-32'158'16,"32"-30"0,-31-2-1,31 2 1,0 30-1,0-31 1,0 32 0,0-64-1,63 32 1,33 32 0,62-64-1,96 64 1,-158-96-16,253 65 15,32-33 17,190-32-17,-63-63 1,0 0 0,-159-63-1,-63-96 1,32-127-1,-128 64 1,-63-96 0,-32-62-1,-31-192 1,-64 413-16,-64-317 16,-190 95-1,-126-63 1,62 126 15,-31 0-15,-64 128-1,-31 0 1,-128 126 0,32 32-1,0 32 1,-31 0-1,126 32 1,191 63-16,-222 191 16,-32 127-1,96-1 1,126 96 0,190-158-1,33 94 1,63-94 15,95 94-15,223-190-1,-96-32 1,159-31 0,127-1-1,-191-126 1,65-33-1,-33 33 1,-95-32 0,-191-32-1,-31 0 1</inkml:trace>
+  <inkml:trace contextRef="#ctx0" brushRef="#br0" timeOffset="98934.15">31972 20352 0,'-190'0'31,"380"0"-31,-634 0 15,285 0 1,0 32 0,96-1-1,-32 64 1,-1-31 0,96-32-1,0 95 79,0 158-78,64-62-1,222 62 1,126 1-1,96-95 1,-63 31 0,31-95-1,-127-63-15,96-33 16,-64-31 0,0 0-1,-127-31 16,-159-97-15,32-62 0,-127-32-1,0-128 1,0 96 0,-95 0-1,-64-31 1,-349-128-1,95 223 1,-31 94 0,158 64-1,64 32 1,0 0 0,-64 0-1,32 0 16,158 0-15,65 0 0</inkml:trace>
+  <inkml:trace contextRef="#ctx0" brushRef="#br0" timeOffset="137269.1">17304 9811 0,'32'0'63,"94"127"-32,-94-95-31,0 31 16,32 0-1,-64-31 1,63 32-1,-31-1 1,-1-63 125,160-95-110,-128 31-15,160-190-1,-64 159-15,95-32 16,-159 32-1,-64 63 1,1 32 0</inkml:trace>
+  <inkml:trace contextRef="#ctx0" brushRef="#br0" timeOffset="138342.97">24479 10922 0,'64'127'63,"-1"127"-32,64-63 0,-127-160-15,64-62 77,31-97-77,32-126 0,0 64-1,-95 126 1,31-94 0,1 94-16,-64 32 15,63-94 1,-31 62-1,0-31 17,-32 63-17</inkml:trace>
+  <inkml:trace contextRef="#ctx0" brushRef="#br0" timeOffset="-213041.54">14446 15176 0,'191'-31'109,"158"126"-93,0 0-1,32-31 1,-159-64 0,64 0-1,95 0 16,191 0-15,95 0 0,-159 0-16,-159-64 15,-64 33-15,160-33 16,158-31 0,-31 63-1,-191-63 1,-64 31-1,-158 64 1,63-95 0,-127 32-1,-31 31 1,0-32 0,-1 32-1,-63 1 48,-222-64-16,-381-128-32,-541 96 1,2-222-1,348 254 1,190 95 0,33 0-1,-159 0 1,190 0 0,-63 0-1,63 0 16,127 0-15,128 0 0,62 32-1,160-1 1,-1 1 0,-31 31-1,32 1 16,31-32-15,0 126 0,0-62-1,32-64 1,0-1 0,0 33 30,0-33-30,0 1 0,159 64-1,127-33 1,63 32 0,-159-31-16,1-64 15,-96 32 1,-63-32-1</inkml:trace>
+</inkml:ink>
+</file>
+
 <file path=ppt/notesMasters/notesMaster1.xml><?xml version="1.0" encoding="utf-8"?>
 <p:notesMaster xmlns:a="http://schemas.openxmlformats.org/drawingml/2006/main" xmlns:r="http://schemas.openxmlformats.org/officeDocument/2006/relationships" xmlns:p="http://schemas.openxmlformats.org/presentationml/2006/main">
   <p:cSld>
@@ -231,7 +275,7 @@
           <a:p>
             <a:fld id="{7E41F15F-CFF1-4FA0-9EAD-88C7CBDFB4C6}" type="datetimeFigureOut">
               <a:rPr lang="es-AR" smtClean="0"/>
-              <a:t>30/10/2024</a:t>
+              <a:t>29/11/2024</a:t>
             </a:fld>
             <a:endParaRPr lang="es-AR"/>
           </a:p>
@@ -390,7 +434,7 @@
           <a:p>
             <a:fld id="{65A068AE-C035-44FC-96C2-FF4389E2CC83}" type="slidenum">
               <a:rPr lang="es-AR" smtClean="0"/>
-              <a:t>‹#›</a:t>
+              <a:t>‹Nº›</a:t>
             </a:fld>
             <a:endParaRPr lang="es-AR"/>
           </a:p>
@@ -594,7 +638,13 @@
   <p:cSld>
     <p:spTree>
       <p:nvGrpSpPr>
-        <p:cNvPr id="1" name=""/>
+        <p:cNvPr id="1" name="">
+          <a:extLst>
+            <a:ext uri="{FF2B5EF4-FFF2-40B4-BE49-F238E27FC236}">
+              <a16:creationId xmlns:a16="http://schemas.microsoft.com/office/drawing/2014/main" id="{B8580F06-0635-3D0E-7E18-57FE6FC155A8}"/>
+            </a:ext>
+          </a:extLst>
+        </p:cNvPr>
         <p:cNvGrpSpPr/>
         <p:nvPr/>
       </p:nvGrpSpPr>
@@ -608,7 +658,13 @@
       </p:grpSpPr>
       <p:sp>
         <p:nvSpPr>
-          <p:cNvPr id="2" name="Slide Image Placeholder 1"/>
+          <p:cNvPr id="2" name="Slide Image Placeholder 1">
+            <a:extLst>
+              <a:ext uri="{FF2B5EF4-FFF2-40B4-BE49-F238E27FC236}">
+                <a16:creationId xmlns:a16="http://schemas.microsoft.com/office/drawing/2014/main" id="{D4DFE612-8BDE-0241-AF0B-44F14B3D5F3C}"/>
+              </a:ext>
+            </a:extLst>
+          </p:cNvPr>
           <p:cNvSpPr>
             <a:spLocks noGrp="1" noRot="1" noChangeAspect="1"/>
           </p:cNvSpPr>
@@ -620,7 +676,13 @@
       </p:sp>
       <p:sp>
         <p:nvSpPr>
-          <p:cNvPr id="3" name="Notes Placeholder 2"/>
+          <p:cNvPr id="3" name="Notes Placeholder 2">
+            <a:extLst>
+              <a:ext uri="{FF2B5EF4-FFF2-40B4-BE49-F238E27FC236}">
+                <a16:creationId xmlns:a16="http://schemas.microsoft.com/office/drawing/2014/main" id="{EA27E50D-FD3E-1E5D-51AF-A71FEBC00313}"/>
+              </a:ext>
+            </a:extLst>
+          </p:cNvPr>
           <p:cNvSpPr>
             <a:spLocks noGrp="1"/>
           </p:cNvSpPr>
@@ -645,7 +707,13 @@
       </p:sp>
       <p:sp>
         <p:nvSpPr>
-          <p:cNvPr id="4" name="Slide Number Placeholder 3"/>
+          <p:cNvPr id="4" name="Slide Number Placeholder 3">
+            <a:extLst>
+              <a:ext uri="{FF2B5EF4-FFF2-40B4-BE49-F238E27FC236}">
+                <a16:creationId xmlns:a16="http://schemas.microsoft.com/office/drawing/2014/main" id="{CB7160CF-A2FB-C80A-D1F9-5D7DE4F61052}"/>
+              </a:ext>
+            </a:extLst>
+          </p:cNvPr>
           <p:cNvSpPr>
             <a:spLocks noGrp="1"/>
           </p:cNvSpPr>
@@ -669,7 +737,7 @@
     </p:spTree>
     <p:extLst>
       <p:ext uri="{BB962C8B-B14F-4D97-AF65-F5344CB8AC3E}">
-        <p14:creationId xmlns:p14="http://schemas.microsoft.com/office/powerpoint/2010/main" val="2479056383"/>
+        <p14:creationId xmlns:p14="http://schemas.microsoft.com/office/powerpoint/2010/main" val="463304327"/>
       </p:ext>
     </p:extLst>
   </p:cSld>
@@ -751,6 +819,96 @@
             <a:fld id="{65A068AE-C035-44FC-96C2-FF4389E2CC83}" type="slidenum">
               <a:rPr lang="es-AR" smtClean="0"/>
               <a:t>5</a:t>
+            </a:fld>
+            <a:endParaRPr lang="es-AR"/>
+          </a:p>
+        </p:txBody>
+      </p:sp>
+    </p:spTree>
+    <p:extLst>
+      <p:ext uri="{BB962C8B-B14F-4D97-AF65-F5344CB8AC3E}">
+        <p14:creationId xmlns:p14="http://schemas.microsoft.com/office/powerpoint/2010/main" val="2479056383"/>
+      </p:ext>
+    </p:extLst>
+  </p:cSld>
+  <p:clrMapOvr>
+    <a:masterClrMapping/>
+  </p:clrMapOvr>
+</p:notes>
+</file>
+
+<file path=ppt/notesSlides/notesSlide4.xml><?xml version="1.0" encoding="utf-8"?>
+<p:notes xmlns:a="http://schemas.openxmlformats.org/drawingml/2006/main" xmlns:r="http://schemas.openxmlformats.org/officeDocument/2006/relationships" xmlns:p="http://schemas.openxmlformats.org/presentationml/2006/main">
+  <p:cSld>
+    <p:spTree>
+      <p:nvGrpSpPr>
+        <p:cNvPr id="1" name=""/>
+        <p:cNvGrpSpPr/>
+        <p:nvPr/>
+      </p:nvGrpSpPr>
+      <p:grpSpPr>
+        <a:xfrm>
+          <a:off x="0" y="0"/>
+          <a:ext cx="0" cy="0"/>
+          <a:chOff x="0" y="0"/>
+          <a:chExt cx="0" cy="0"/>
+        </a:xfrm>
+      </p:grpSpPr>
+      <p:sp>
+        <p:nvSpPr>
+          <p:cNvPr id="2" name="Slide Image Placeholder 1"/>
+          <p:cNvSpPr>
+            <a:spLocks noGrp="1" noRot="1" noChangeAspect="1"/>
+          </p:cNvSpPr>
+          <p:nvPr>
+            <p:ph type="sldImg"/>
+          </p:nvPr>
+        </p:nvSpPr>
+        <p:spPr/>
+      </p:sp>
+      <p:sp>
+        <p:nvSpPr>
+          <p:cNvPr id="3" name="Notes Placeholder 2"/>
+          <p:cNvSpPr>
+            <a:spLocks noGrp="1"/>
+          </p:cNvSpPr>
+          <p:nvPr>
+            <p:ph type="body" idx="1"/>
+          </p:nvPr>
+        </p:nvSpPr>
+        <p:spPr/>
+        <p:txBody>
+          <a:bodyPr/>
+          <a:lstStyle/>
+          <a:p>
+            <a:r>
+              <a:rPr lang="es-AR" dirty="0">
+                <a:hlinkClick r:id="rId3" tooltip="https://github.com/buritica/mgt/blob/master/es/guia-de-rfcs.md"/>
+              </a:rPr>
+              <a:t>https://github.com/buritica/mgt/blob/master/es/guia-de-rfcs.md</a:t>
+            </a:r>
+            <a:endParaRPr lang="es-AR" dirty="0"/>
+          </a:p>
+        </p:txBody>
+      </p:sp>
+      <p:sp>
+        <p:nvSpPr>
+          <p:cNvPr id="4" name="Slide Number Placeholder 3"/>
+          <p:cNvSpPr>
+            <a:spLocks noGrp="1"/>
+          </p:cNvSpPr>
+          <p:nvPr>
+            <p:ph type="sldNum" sz="quarter" idx="5"/>
+          </p:nvPr>
+        </p:nvSpPr>
+        <p:spPr/>
+        <p:txBody>
+          <a:bodyPr/>
+          <a:lstStyle/>
+          <a:p>
+            <a:fld id="{65A068AE-C035-44FC-96C2-FF4389E2CC83}" type="slidenum">
+              <a:rPr lang="es-AR" smtClean="0"/>
+              <a:t>6</a:t>
             </a:fld>
             <a:endParaRPr lang="es-AR"/>
           </a:p>
@@ -949,7 +1107,7 @@
             <a:fld id="{1D8BD707-D9CF-40AE-B4C6-C98DA3205C09}" type="datetimeFigureOut">
               <a:rPr lang="en-US" smtClean="0"/>
               <a:pPr/>
-              <a:t>10/30/2024</a:t>
+              <a:t>11/29/2024</a:t>
             </a:fld>
             <a:endParaRPr lang="en-US"/>
           </a:p>
@@ -992,7 +1150,7 @@
             <a:fld id="{B6F15528-21DE-4FAA-801E-634DDDAF4B2B}" type="slidenum">
               <a:rPr lang="en-US" smtClean="0"/>
               <a:pPr/>
-              <a:t>‹#›</a:t>
+              <a:t>‹Nº›</a:t>
             </a:fld>
             <a:endParaRPr lang="en-US"/>
           </a:p>
@@ -1114,7 +1272,7 @@
             <a:fld id="{1D8BD707-D9CF-40AE-B4C6-C98DA3205C09}" type="datetimeFigureOut">
               <a:rPr lang="en-US" smtClean="0"/>
               <a:pPr/>
-              <a:t>10/30/2024</a:t>
+              <a:t>11/29/2024</a:t>
             </a:fld>
             <a:endParaRPr lang="en-US"/>
           </a:p>
@@ -1157,7 +1315,7 @@
             <a:fld id="{B6F15528-21DE-4FAA-801E-634DDDAF4B2B}" type="slidenum">
               <a:rPr lang="en-US" smtClean="0"/>
               <a:pPr/>
-              <a:t>‹#›</a:t>
+              <a:t>‹Nº›</a:t>
             </a:fld>
             <a:endParaRPr lang="en-US"/>
           </a:p>
@@ -1289,7 +1447,7 @@
             <a:fld id="{1D8BD707-D9CF-40AE-B4C6-C98DA3205C09}" type="datetimeFigureOut">
               <a:rPr lang="en-US" smtClean="0"/>
               <a:pPr/>
-              <a:t>10/30/2024</a:t>
+              <a:t>11/29/2024</a:t>
             </a:fld>
             <a:endParaRPr lang="en-US"/>
           </a:p>
@@ -1332,7 +1490,7 @@
             <a:fld id="{B6F15528-21DE-4FAA-801E-634DDDAF4B2B}" type="slidenum">
               <a:rPr lang="en-US" smtClean="0"/>
               <a:pPr/>
-              <a:t>‹#›</a:t>
+              <a:t>‹Nº›</a:t>
             </a:fld>
             <a:endParaRPr lang="en-US"/>
           </a:p>
@@ -1454,7 +1612,7 @@
             <a:fld id="{1D8BD707-D9CF-40AE-B4C6-C98DA3205C09}" type="datetimeFigureOut">
               <a:rPr lang="en-US" smtClean="0"/>
               <a:pPr/>
-              <a:t>10/30/2024</a:t>
+              <a:t>11/29/2024</a:t>
             </a:fld>
             <a:endParaRPr lang="en-US"/>
           </a:p>
@@ -1497,7 +1655,7 @@
             <a:fld id="{B6F15528-21DE-4FAA-801E-634DDDAF4B2B}" type="slidenum">
               <a:rPr lang="en-US" smtClean="0"/>
               <a:pPr/>
-              <a:t>‹#›</a:t>
+              <a:t>‹Nº›</a:t>
             </a:fld>
             <a:endParaRPr lang="en-US"/>
           </a:p>
@@ -1696,7 +1854,7 @@
             <a:fld id="{1D8BD707-D9CF-40AE-B4C6-C98DA3205C09}" type="datetimeFigureOut">
               <a:rPr lang="en-US" smtClean="0"/>
               <a:pPr/>
-              <a:t>10/30/2024</a:t>
+              <a:t>11/29/2024</a:t>
             </a:fld>
             <a:endParaRPr lang="en-US"/>
           </a:p>
@@ -1739,7 +1897,7 @@
             <a:fld id="{B6F15528-21DE-4FAA-801E-634DDDAF4B2B}" type="slidenum">
               <a:rPr lang="en-US" smtClean="0"/>
               <a:pPr/>
-              <a:t>‹#›</a:t>
+              <a:t>‹Nº›</a:t>
             </a:fld>
             <a:endParaRPr lang="en-US"/>
           </a:p>
@@ -1978,7 +2136,7 @@
             <a:fld id="{1D8BD707-D9CF-40AE-B4C6-C98DA3205C09}" type="datetimeFigureOut">
               <a:rPr lang="en-US" smtClean="0"/>
               <a:pPr/>
-              <a:t>10/30/2024</a:t>
+              <a:t>11/29/2024</a:t>
             </a:fld>
             <a:endParaRPr lang="en-US"/>
           </a:p>
@@ -2021,7 +2179,7 @@
             <a:fld id="{B6F15528-21DE-4FAA-801E-634DDDAF4B2B}" type="slidenum">
               <a:rPr lang="en-US" smtClean="0"/>
               <a:pPr/>
-              <a:t>‹#›</a:t>
+              <a:t>‹Nº›</a:t>
             </a:fld>
             <a:endParaRPr lang="en-US"/>
           </a:p>
@@ -2394,7 +2552,7 @@
             <a:fld id="{1D8BD707-D9CF-40AE-B4C6-C98DA3205C09}" type="datetimeFigureOut">
               <a:rPr lang="en-US" smtClean="0"/>
               <a:pPr/>
-              <a:t>10/30/2024</a:t>
+              <a:t>11/29/2024</a:t>
             </a:fld>
             <a:endParaRPr lang="en-US"/>
           </a:p>
@@ -2437,7 +2595,7 @@
             <a:fld id="{B6F15528-21DE-4FAA-801E-634DDDAF4B2B}" type="slidenum">
               <a:rPr lang="en-US" smtClean="0"/>
               <a:pPr/>
-              <a:t>‹#›</a:t>
+              <a:t>‹Nº›</a:t>
             </a:fld>
             <a:endParaRPr lang="en-US"/>
           </a:p>
@@ -2508,7 +2666,7 @@
             <a:fld id="{1D8BD707-D9CF-40AE-B4C6-C98DA3205C09}" type="datetimeFigureOut">
               <a:rPr lang="en-US" smtClean="0"/>
               <a:pPr/>
-              <a:t>10/30/2024</a:t>
+              <a:t>11/29/2024</a:t>
             </a:fld>
             <a:endParaRPr lang="en-US"/>
           </a:p>
@@ -2551,7 +2709,7 @@
             <a:fld id="{B6F15528-21DE-4FAA-801E-634DDDAF4B2B}" type="slidenum">
               <a:rPr lang="en-US" smtClean="0"/>
               <a:pPr/>
-              <a:t>‹#›</a:t>
+              <a:t>‹Nº›</a:t>
             </a:fld>
             <a:endParaRPr lang="en-US"/>
           </a:p>
@@ -2600,7 +2758,7 @@
             <a:fld id="{1D8BD707-D9CF-40AE-B4C6-C98DA3205C09}" type="datetimeFigureOut">
               <a:rPr lang="en-US" smtClean="0"/>
               <a:pPr/>
-              <a:t>10/30/2024</a:t>
+              <a:t>11/29/2024</a:t>
             </a:fld>
             <a:endParaRPr lang="en-US"/>
           </a:p>
@@ -2643,7 +2801,7 @@
             <a:fld id="{B6F15528-21DE-4FAA-801E-634DDDAF4B2B}" type="slidenum">
               <a:rPr lang="en-US" smtClean="0"/>
               <a:pPr/>
-              <a:t>‹#›</a:t>
+              <a:t>‹Nº›</a:t>
             </a:fld>
             <a:endParaRPr lang="en-US"/>
           </a:p>
@@ -2872,7 +3030,7 @@
             <a:fld id="{1D8BD707-D9CF-40AE-B4C6-C98DA3205C09}" type="datetimeFigureOut">
               <a:rPr lang="en-US" smtClean="0"/>
               <a:pPr/>
-              <a:t>10/30/2024</a:t>
+              <a:t>11/29/2024</a:t>
             </a:fld>
             <a:endParaRPr lang="en-US"/>
           </a:p>
@@ -2915,7 +3073,7 @@
             <a:fld id="{B6F15528-21DE-4FAA-801E-634DDDAF4B2B}" type="slidenum">
               <a:rPr lang="en-US" smtClean="0"/>
               <a:pPr/>
-              <a:t>‹#›</a:t>
+              <a:t>‹Nº›</a:t>
             </a:fld>
             <a:endParaRPr lang="en-US"/>
           </a:p>
@@ -3121,7 +3279,7 @@
             <a:fld id="{1D8BD707-D9CF-40AE-B4C6-C98DA3205C09}" type="datetimeFigureOut">
               <a:rPr lang="en-US" smtClean="0"/>
               <a:pPr/>
-              <a:t>10/30/2024</a:t>
+              <a:t>11/29/2024</a:t>
             </a:fld>
             <a:endParaRPr lang="en-US"/>
           </a:p>
@@ -3164,7 +3322,7 @@
             <a:fld id="{B6F15528-21DE-4FAA-801E-634DDDAF4B2B}" type="slidenum">
               <a:rPr lang="en-US" smtClean="0"/>
               <a:pPr/>
-              <a:t>‹#›</a:t>
+              <a:t>‹Nº›</a:t>
             </a:fld>
             <a:endParaRPr lang="en-US"/>
           </a:p>
@@ -3329,7 +3487,7 @@
             <a:fld id="{1D8BD707-D9CF-40AE-B4C6-C98DA3205C09}" type="datetimeFigureOut">
               <a:rPr lang="en-US" smtClean="0"/>
               <a:pPr/>
-              <a:t>10/30/2024</a:t>
+              <a:t>11/29/2024</a:t>
             </a:fld>
             <a:endParaRPr lang="en-US"/>
           </a:p>
@@ -3408,7 +3566,7 @@
             <a:fld id="{B6F15528-21DE-4FAA-801E-634DDDAF4B2B}" type="slidenum">
               <a:rPr lang="en-US" smtClean="0"/>
               <a:pPr/>
-              <a:t>‹#›</a:t>
+              <a:t>‹Nº›</a:t>
             </a:fld>
             <a:endParaRPr lang="en-US"/>
           </a:p>
@@ -5220,12 +5378,211 @@
           </a:p>
         </p:txBody>
       </p:sp>
+      <p:pic>
+        <p:nvPicPr>
+          <p:cNvPr id="1026" name="Picture 2" descr="▷ Utilizando GIT a nivel básico -- Dungeon of Bits">
+            <a:extLst>
+              <a:ext uri="{FF2B5EF4-FFF2-40B4-BE49-F238E27FC236}">
+                <a16:creationId xmlns:a16="http://schemas.microsoft.com/office/drawing/2014/main" id="{6F8F8F17-6346-A309-C9A2-3EA7A7581373}"/>
+              </a:ext>
+            </a:extLst>
+          </p:cNvPr>
+          <p:cNvPicPr>
+            <a:picLocks noChangeAspect="1" noChangeArrowheads="1"/>
+          </p:cNvPicPr>
+          <p:nvPr/>
+        </p:nvPicPr>
+        <p:blipFill>
+          <a:blip r:embed="rId3">
+            <a:extLst>
+              <a:ext uri="{28A0092B-C50C-407E-A947-70E740481C1C}">
+                <a14:useLocalDpi xmlns:a14="http://schemas.microsoft.com/office/drawing/2010/main" val="0"/>
+              </a:ext>
+            </a:extLst>
+          </a:blip>
+          <a:srcRect/>
+          <a:stretch>
+            <a:fillRect/>
+          </a:stretch>
+        </p:blipFill>
+        <p:spPr bwMode="auto">
+          <a:xfrm>
+            <a:off x="2438400" y="1264565"/>
+            <a:ext cx="12299302" cy="8225158"/>
+          </a:xfrm>
+          <a:prstGeom prst="rect">
+            <a:avLst/>
+          </a:prstGeom>
+          <a:noFill/>
+          <a:extLst>
+            <a:ext uri="{909E8E84-426E-40DD-AFC4-6F175D3DCCD1}">
+              <a14:hiddenFill xmlns:a14="http://schemas.microsoft.com/office/drawing/2010/main">
+                <a:solidFill>
+                  <a:srgbClr val="FFFFFF"/>
+                </a:solidFill>
+              </a14:hiddenFill>
+            </a:ext>
+          </a:extLst>
+        </p:spPr>
+      </p:pic>
+      <mc:AlternateContent xmlns:mc="http://schemas.openxmlformats.org/markup-compatibility/2006">
+        <mc:Choice xmlns:p14="http://schemas.microsoft.com/office/powerpoint/2010/main" Requires="p14">
+          <p:contentPart p14:bwMode="auto" r:id="rId4">
+            <p14:nvContentPartPr>
+              <p14:cNvPr id="3" name="Entrada de lápiz 2">
+                <a:extLst>
+                  <a:ext uri="{FF2B5EF4-FFF2-40B4-BE49-F238E27FC236}">
+                    <a16:creationId xmlns:a16="http://schemas.microsoft.com/office/drawing/2014/main" id="{3CC26E49-CB75-2710-1A66-36D7A3205D44}"/>
+                  </a:ext>
+                </a:extLst>
+              </p14:cNvPr>
+              <p14:cNvContentPartPr/>
+              <p14:nvPr/>
+            </p14:nvContentPartPr>
+            <p14:xfrm>
+              <a:off x="3040560" y="1120320"/>
+              <a:ext cx="11955960" cy="6960960"/>
+            </p14:xfrm>
+          </p:contentPart>
+        </mc:Choice>
+        <mc:Fallback>
+          <p:pic>
+            <p:nvPicPr>
+              <p:cNvPr id="3" name="Entrada de lápiz 2">
+                <a:extLst>
+                  <a:ext uri="{FF2B5EF4-FFF2-40B4-BE49-F238E27FC236}">
+                    <a16:creationId xmlns:a16="http://schemas.microsoft.com/office/drawing/2014/main" id="{3CC26E49-CB75-2710-1A66-36D7A3205D44}"/>
+                  </a:ext>
+                </a:extLst>
+              </p:cNvPr>
+              <p:cNvPicPr/>
+              <p:nvPr/>
+            </p:nvPicPr>
+            <p:blipFill>
+              <a:blip r:embed="rId5"/>
+              <a:stretch>
+                <a:fillRect/>
+              </a:stretch>
+            </p:blipFill>
+            <p:spPr>
+              <a:xfrm>
+                <a:off x="3031200" y="1110960"/>
+                <a:ext cx="11974680" cy="6979680"/>
+              </a:xfrm>
+              <a:prstGeom prst="rect">
+                <a:avLst/>
+              </a:prstGeom>
+            </p:spPr>
+          </p:pic>
+        </mc:Fallback>
+      </mc:AlternateContent>
+    </p:spTree>
+    <p:extLst>
+      <p:ext uri="{BB962C8B-B14F-4D97-AF65-F5344CB8AC3E}">
+        <p14:creationId xmlns:p14="http://schemas.microsoft.com/office/powerpoint/2010/main" val="2619642255"/>
+      </p:ext>
+    </p:extLst>
+  </p:cSld>
+  <p:clrMapOvr>
+    <a:masterClrMapping/>
+  </p:clrMapOvr>
+</p:sld>
+</file>
+
+<file path=ppt/slides/slide4.xml><?xml version="1.0" encoding="utf-8"?>
+<p:sld xmlns:a="http://schemas.openxmlformats.org/drawingml/2006/main" xmlns:r="http://schemas.openxmlformats.org/officeDocument/2006/relationships" xmlns:p="http://schemas.openxmlformats.org/presentationml/2006/main">
+  <p:cSld>
+    <p:bg>
+      <p:bgPr>
+        <a:solidFill>
+          <a:schemeClr val="bg1"/>
+        </a:solidFill>
+        <a:effectLst/>
+      </p:bgPr>
+    </p:bg>
+    <p:spTree>
+      <p:nvGrpSpPr>
+        <p:cNvPr id="1" name="">
+          <a:extLst>
+            <a:ext uri="{FF2B5EF4-FFF2-40B4-BE49-F238E27FC236}">
+              <a16:creationId xmlns:a16="http://schemas.microsoft.com/office/drawing/2014/main" id="{A1A4362D-EE7A-B99B-8489-25A0F6FBA74D}"/>
+            </a:ext>
+          </a:extLst>
+        </p:cNvPr>
+        <p:cNvGrpSpPr/>
+        <p:nvPr/>
+      </p:nvGrpSpPr>
+      <p:grpSpPr>
+        <a:xfrm>
+          <a:off x="0" y="0"/>
+          <a:ext cx="0" cy="0"/>
+          <a:chOff x="0" y="0"/>
+          <a:chExt cx="0" cy="0"/>
+        </a:xfrm>
+      </p:grpSpPr>
+      <p:sp>
+        <p:nvSpPr>
+          <p:cNvPr id="2" name="TextBox 2">
+            <a:extLst>
+              <a:ext uri="{FF2B5EF4-FFF2-40B4-BE49-F238E27FC236}">
+                <a16:creationId xmlns:a16="http://schemas.microsoft.com/office/drawing/2014/main" id="{9648C038-5B7B-348C-3E82-5E2AB578D811}"/>
+              </a:ext>
+            </a:extLst>
+          </p:cNvPr>
+          <p:cNvSpPr txBox="1"/>
+          <p:nvPr/>
+        </p:nvSpPr>
+        <p:spPr>
+          <a:xfrm>
+            <a:off x="1295400" y="419100"/>
+            <a:ext cx="8991600" cy="615553"/>
+          </a:xfrm>
+          <a:prstGeom prst="rect">
+            <a:avLst/>
+          </a:prstGeom>
+        </p:spPr>
+        <p:txBody>
+          <a:bodyPr wrap="square" lIns="0" tIns="0" rIns="0" bIns="0" rtlCol="0" anchor="t">
+            <a:spAutoFit/>
+          </a:bodyPr>
+          <a:lstStyle/>
+          <a:p>
+            <a:r>
+              <a:rPr lang="en-US" sz="4000" b="1" spc="75" dirty="0">
+                <a:solidFill>
+                  <a:schemeClr val="tx2"/>
+                </a:solidFill>
+                <a:latin typeface="Poppins Medium" panose="00000600000000000000" pitchFamily="2" charset="0"/>
+                <a:cs typeface="Poppins Medium" panose="00000600000000000000" pitchFamily="2" charset="0"/>
+              </a:rPr>
+              <a:t> </a:t>
+            </a:r>
+            <a:r>
+              <a:rPr lang="es-ES" sz="4000" b="1" spc="75" dirty="0">
+                <a:solidFill>
+                  <a:schemeClr val="tx2"/>
+                </a:solidFill>
+                <a:latin typeface="Poppins Medium" panose="00000600000000000000" pitchFamily="2" charset="0"/>
+                <a:cs typeface="Poppins Medium" panose="00000600000000000000" pitchFamily="2" charset="0"/>
+              </a:rPr>
+              <a:t>CREACIÓN DE RAMAS EN GITHUB</a:t>
+            </a:r>
+            <a:endParaRPr lang="en-US" sz="4000" b="1" spc="75" dirty="0">
+              <a:solidFill>
+                <a:schemeClr val="tx2"/>
+              </a:solidFill>
+              <a:latin typeface="Poppins Medium" panose="00000600000000000000" pitchFamily="2" charset="0"/>
+              <a:cs typeface="Poppins Medium" panose="00000600000000000000" pitchFamily="2" charset="0"/>
+            </a:endParaRPr>
+          </a:p>
+        </p:txBody>
+      </p:sp>
       <p:sp>
         <p:nvSpPr>
           <p:cNvPr id="9" name="TextBox 8">
             <a:extLst>
               <a:ext uri="{FF2B5EF4-FFF2-40B4-BE49-F238E27FC236}">
-                <a16:creationId xmlns:a16="http://schemas.microsoft.com/office/drawing/2014/main" id="{1D113D67-5430-8F02-889A-B3959B661CF5}"/>
+                <a16:creationId xmlns:a16="http://schemas.microsoft.com/office/drawing/2014/main" id="{F7B0E0FF-D9AA-EA93-ABA7-EE77D1E40380}"/>
               </a:ext>
             </a:extLst>
           </p:cNvPr>
@@ -5397,7 +5754,7 @@
           <p:cNvPr id="18" name="Picture 17">
             <a:extLst>
               <a:ext uri="{FF2B5EF4-FFF2-40B4-BE49-F238E27FC236}">
-                <a16:creationId xmlns:a16="http://schemas.microsoft.com/office/drawing/2014/main" id="{928A4BD6-3BB6-7824-4F17-E3794A591795}"/>
+                <a16:creationId xmlns:a16="http://schemas.microsoft.com/office/drawing/2014/main" id="{D5B6F058-C5AB-8137-C208-9E9CEFD30C4C}"/>
               </a:ext>
             </a:extLst>
           </p:cNvPr>
@@ -5427,7 +5784,7 @@
           <p:cNvPr id="23" name="Picture 22">
             <a:extLst>
               <a:ext uri="{FF2B5EF4-FFF2-40B4-BE49-F238E27FC236}">
-                <a16:creationId xmlns:a16="http://schemas.microsoft.com/office/drawing/2014/main" id="{E0510EBB-4D3C-6579-AAD7-6169FD9511ED}"/>
+                <a16:creationId xmlns:a16="http://schemas.microsoft.com/office/drawing/2014/main" id="{3CD54612-A748-182E-F521-6DF80688C3A9}"/>
               </a:ext>
             </a:extLst>
           </p:cNvPr>
@@ -5457,7 +5814,7 @@
           <p:cNvPr id="26" name="Picture 25">
             <a:extLst>
               <a:ext uri="{FF2B5EF4-FFF2-40B4-BE49-F238E27FC236}">
-                <a16:creationId xmlns:a16="http://schemas.microsoft.com/office/drawing/2014/main" id="{606BC44C-E2D6-64C2-7897-841838C683D3}"/>
+                <a16:creationId xmlns:a16="http://schemas.microsoft.com/office/drawing/2014/main" id="{748CDCDF-329D-D262-A54E-94041432296B}"/>
               </a:ext>
             </a:extLst>
           </p:cNvPr>
@@ -5485,7 +5842,7 @@
     </p:spTree>
     <p:extLst>
       <p:ext uri="{BB962C8B-B14F-4D97-AF65-F5344CB8AC3E}">
-        <p14:creationId xmlns:p14="http://schemas.microsoft.com/office/powerpoint/2010/main" val="2619642255"/>
+        <p14:creationId xmlns:p14="http://schemas.microsoft.com/office/powerpoint/2010/main" val="3574641467"/>
       </p:ext>
     </p:extLst>
   </p:cSld>
@@ -5495,7 +5852,7 @@
 </p:sld>
 </file>
 
-<file path=ppt/slides/slide4.xml><?xml version="1.0" encoding="utf-8"?>
+<file path=ppt/slides/slide5.xml><?xml version="1.0" encoding="utf-8"?>
 <p:sld xmlns:a="http://schemas.openxmlformats.org/drawingml/2006/main" xmlns:r="http://schemas.openxmlformats.org/officeDocument/2006/relationships" xmlns:p="http://schemas.openxmlformats.org/presentationml/2006/main">
   <p:cSld>
     <p:bg>
@@ -7140,7 +7497,7 @@
 </p:sld>
 </file>
 
-<file path=ppt/slides/slide5.xml><?xml version="1.0" encoding="utf-8"?>
+<file path=ppt/slides/slide6.xml><?xml version="1.0" encoding="utf-8"?>
 <p:sld xmlns:a="http://schemas.openxmlformats.org/drawingml/2006/main" xmlns:r="http://schemas.openxmlformats.org/officeDocument/2006/relationships" xmlns:p="http://schemas.openxmlformats.org/presentationml/2006/main">
   <p:cSld>
     <p:spTree>

</xml_diff>